<commit_message>
Taxi Allocation in World-Machine updated
</commit_message>
<xml_diff>
--- a/OtherStuff/Presentation/Goal + fun req + world and the machine.pptx
+++ b/OtherStuff/Presentation/Goal + fun req + world and the machine.pptx
@@ -255,7 +255,7 @@
           <a:p>
             <a:fld id="{25E65E3D-A1FC-4B1A-AB2F-83B863B73A76}" type="datetimeFigureOut">
               <a:rPr lang="it-IT" smtClean="0"/>
-              <a:t>09/11/2015</a:t>
+              <a:t>10/11/2015</a:t>
             </a:fld>
             <a:endParaRPr lang="it-IT"/>
           </a:p>
@@ -425,7 +425,7 @@
           <a:p>
             <a:fld id="{25E65E3D-A1FC-4B1A-AB2F-83B863B73A76}" type="datetimeFigureOut">
               <a:rPr lang="it-IT" smtClean="0"/>
-              <a:t>09/11/2015</a:t>
+              <a:t>10/11/2015</a:t>
             </a:fld>
             <a:endParaRPr lang="it-IT"/>
           </a:p>
@@ -605,7 +605,7 @@
           <a:p>
             <a:fld id="{25E65E3D-A1FC-4B1A-AB2F-83B863B73A76}" type="datetimeFigureOut">
               <a:rPr lang="it-IT" smtClean="0"/>
-              <a:t>09/11/2015</a:t>
+              <a:t>10/11/2015</a:t>
             </a:fld>
             <a:endParaRPr lang="it-IT"/>
           </a:p>
@@ -775,7 +775,7 @@
           <a:p>
             <a:fld id="{25E65E3D-A1FC-4B1A-AB2F-83B863B73A76}" type="datetimeFigureOut">
               <a:rPr lang="it-IT" smtClean="0"/>
-              <a:t>09/11/2015</a:t>
+              <a:t>10/11/2015</a:t>
             </a:fld>
             <a:endParaRPr lang="it-IT"/>
           </a:p>
@@ -1019,7 +1019,7 @@
           <a:p>
             <a:fld id="{25E65E3D-A1FC-4B1A-AB2F-83B863B73A76}" type="datetimeFigureOut">
               <a:rPr lang="it-IT" smtClean="0"/>
-              <a:t>09/11/2015</a:t>
+              <a:t>10/11/2015</a:t>
             </a:fld>
             <a:endParaRPr lang="it-IT"/>
           </a:p>
@@ -1251,7 +1251,7 @@
           <a:p>
             <a:fld id="{25E65E3D-A1FC-4B1A-AB2F-83B863B73A76}" type="datetimeFigureOut">
               <a:rPr lang="it-IT" smtClean="0"/>
-              <a:t>09/11/2015</a:t>
+              <a:t>10/11/2015</a:t>
             </a:fld>
             <a:endParaRPr lang="it-IT"/>
           </a:p>
@@ -1618,7 +1618,7 @@
           <a:p>
             <a:fld id="{25E65E3D-A1FC-4B1A-AB2F-83B863B73A76}" type="datetimeFigureOut">
               <a:rPr lang="it-IT" smtClean="0"/>
-              <a:t>09/11/2015</a:t>
+              <a:t>10/11/2015</a:t>
             </a:fld>
             <a:endParaRPr lang="it-IT"/>
           </a:p>
@@ -1736,7 +1736,7 @@
           <a:p>
             <a:fld id="{25E65E3D-A1FC-4B1A-AB2F-83B863B73A76}" type="datetimeFigureOut">
               <a:rPr lang="it-IT" smtClean="0"/>
-              <a:t>09/11/2015</a:t>
+              <a:t>10/11/2015</a:t>
             </a:fld>
             <a:endParaRPr lang="it-IT"/>
           </a:p>
@@ -1831,7 +1831,7 @@
           <a:p>
             <a:fld id="{25E65E3D-A1FC-4B1A-AB2F-83B863B73A76}" type="datetimeFigureOut">
               <a:rPr lang="it-IT" smtClean="0"/>
-              <a:t>09/11/2015</a:t>
+              <a:t>10/11/2015</a:t>
             </a:fld>
             <a:endParaRPr lang="it-IT"/>
           </a:p>
@@ -2108,7 +2108,7 @@
           <a:p>
             <a:fld id="{25E65E3D-A1FC-4B1A-AB2F-83B863B73A76}" type="datetimeFigureOut">
               <a:rPr lang="it-IT" smtClean="0"/>
-              <a:t>09/11/2015</a:t>
+              <a:t>10/11/2015</a:t>
             </a:fld>
             <a:endParaRPr lang="it-IT"/>
           </a:p>
@@ -2365,7 +2365,7 @@
           <a:p>
             <a:fld id="{25E65E3D-A1FC-4B1A-AB2F-83B863B73A76}" type="datetimeFigureOut">
               <a:rPr lang="it-IT" smtClean="0"/>
-              <a:t>09/11/2015</a:t>
+              <a:t>10/11/2015</a:t>
             </a:fld>
             <a:endParaRPr lang="it-IT"/>
           </a:p>
@@ -2578,7 +2578,7 @@
           <a:p>
             <a:fld id="{25E65E3D-A1FC-4B1A-AB2F-83B863B73A76}" type="datetimeFigureOut">
               <a:rPr lang="it-IT" smtClean="0"/>
-              <a:t>09/11/2015</a:t>
+              <a:t>10/11/2015</a:t>
             </a:fld>
             <a:endParaRPr lang="it-IT"/>
           </a:p>
@@ -5028,7 +5028,7 @@
         <p:spPr>
           <a:xfrm>
             <a:off x="5328681" y="1999345"/>
-            <a:ext cx="3381896" cy="4189608"/>
+            <a:ext cx="3381896" cy="5112938"/>
           </a:xfrm>
           <a:prstGeom prst="rect">
             <a:avLst/>
@@ -5046,20 +5046,49 @@
               <a:buChar char="•"/>
             </a:pPr>
             <a:r>
-              <a:rPr lang="en-US" sz="1200" i="1" dirty="0">
+              <a:rPr lang="en-US" sz="1200" i="1" dirty="0" smtClean="0">
                 <a:latin typeface="Georgia" panose="02040502050405020303" pitchFamily="18" charset="0"/>
               </a:rPr>
               <a:t>Taxi allocation</a:t>
             </a:r>
             <a:r>
+              <a:rPr lang="en-US" sz="1200" dirty="0" smtClean="0">
+                <a:latin typeface="Georgia" panose="02040502050405020303" pitchFamily="18" charset="0"/>
+              </a:rPr>
+              <a:t> - </a:t>
+            </a:r>
+            <a:r>
               <a:rPr lang="en-US" sz="1200" dirty="0">
                 <a:latin typeface="Georgia" panose="02040502050405020303" pitchFamily="18" charset="0"/>
-              </a:rPr>
-              <a:t> - is observed by the world and controlled by the machine, which sets the taxi’s next destination accordingly to the customer requests. </a:t>
-            </a:r>
-            <a:endParaRPr lang="it-IT" sz="1200" dirty="0">
-              <a:latin typeface="Georgia" panose="02040502050405020303" pitchFamily="18" charset="0"/>
-            </a:endParaRPr>
+                <a:ea typeface="Calibri" panose="020F0502020204030204" pitchFamily="34" charset="0"/>
+                <a:cs typeface="Arial" panose="020B0604020202020204" pitchFamily="34" charset="0"/>
+              </a:rPr>
+              <a:t>is a particular entity: if we consider MTS customers, is observed by the world and controlled by the machine (which sets the taxi’s next destination accordingly to the customer requests); if we consider standard customers, then it is observed by the machine (with the GPS and </a:t>
+            </a:r>
+            <a:r>
+              <a:rPr lang="en-US" sz="1200" dirty="0" smtClean="0">
+                <a:latin typeface="Georgia" panose="02040502050405020303" pitchFamily="18" charset="0"/>
+                <a:ea typeface="Calibri" panose="020F0502020204030204" pitchFamily="34" charset="0"/>
+                <a:cs typeface="Arial" panose="020B0604020202020204" pitchFamily="34" charset="0"/>
+              </a:rPr>
+              <a:t>taxi zones system</a:t>
+            </a:r>
+            <a:r>
+              <a:rPr lang="en-US" sz="1200" dirty="0">
+                <a:latin typeface="Georgia" panose="02040502050405020303" pitchFamily="18" charset="0"/>
+                <a:ea typeface="Calibri" panose="020F0502020204030204" pitchFamily="34" charset="0"/>
+                <a:cs typeface="Arial" panose="020B0604020202020204" pitchFamily="34" charset="0"/>
+              </a:rPr>
+              <a:t>) and controlled by the world (i.e. the standard customer</a:t>
+            </a:r>
+            <a:r>
+              <a:rPr lang="en-US" sz="1200" dirty="0" smtClean="0">
+                <a:latin typeface="Georgia" panose="02040502050405020303" pitchFamily="18" charset="0"/>
+                <a:ea typeface="Calibri" panose="020F0502020204030204" pitchFamily="34" charset="0"/>
+                <a:cs typeface="Arial" panose="020B0604020202020204" pitchFamily="34" charset="0"/>
+              </a:rPr>
+              <a:t>).</a:t>
+            </a:r>
           </a:p>
           <a:p>
             <a:pPr marL="214308" indent="-214308">
@@ -5067,18 +5096,18 @@
               <a:buChar char="•"/>
             </a:pPr>
             <a:r>
-              <a:rPr lang="en-US" sz="1200" i="1" dirty="0">
+              <a:rPr lang="en-US" sz="1200" i="1" dirty="0" smtClean="0">
                 <a:latin typeface="Georgia" panose="02040502050405020303" pitchFamily="18" charset="0"/>
               </a:rPr>
               <a:t>Customer requesting ride </a:t>
             </a:r>
             <a:r>
-              <a:rPr lang="en-US" sz="1200" dirty="0">
+              <a:rPr lang="en-US" sz="1200" dirty="0" smtClean="0">
                 <a:latin typeface="Georgia" panose="02040502050405020303" pitchFamily="18" charset="0"/>
               </a:rPr>
               <a:t>- happens in the world and is only observed by the machine, which will react accordingly.</a:t>
             </a:r>
-            <a:endParaRPr lang="en-US" sz="1200" i="1" dirty="0">
+            <a:endParaRPr lang="en-US" sz="1200" i="1" dirty="0" smtClean="0">
               <a:latin typeface="Georgia" panose="02040502050405020303" pitchFamily="18" charset="0"/>
             </a:endParaRPr>
           </a:p>
@@ -5088,10 +5117,16 @@
               <a:buChar char="•"/>
             </a:pPr>
             <a:r>
+              <a:rPr lang="en-US" sz="1200" i="1" dirty="0" smtClean="0">
+                <a:latin typeface="Georgia" panose="02040502050405020303" pitchFamily="18" charset="0"/>
+              </a:rPr>
+              <a:t>Taxi </a:t>
+            </a:r>
+            <a:r>
               <a:rPr lang="en-US" sz="1200" i="1" dirty="0">
                 <a:latin typeface="Georgia" panose="02040502050405020303" pitchFamily="18" charset="0"/>
               </a:rPr>
-              <a:t>Taxi moves</a:t>
+              <a:t>moves</a:t>
             </a:r>
             <a:r>
               <a:rPr lang="en-US" sz="1200" dirty="0">

</xml_diff>